<commit_message>
updated data and improved animations
</commit_message>
<xml_diff>
--- a/Plotly_Viz_corona.pptx
+++ b/Plotly_Viz_corona.pptx
@@ -5,16 +5,17 @@
     <p:sldMasterId id="2147483648" r:id="rId1"/>
   </p:sldMasterIdLst>
   <p:notesMasterIdLst>
-    <p:notesMasterId r:id="rId9"/>
+    <p:notesMasterId r:id="rId10"/>
   </p:notesMasterIdLst>
   <p:sldIdLst>
     <p:sldId id="256" r:id="rId2"/>
     <p:sldId id="257" r:id="rId3"/>
-    <p:sldId id="258" r:id="rId4"/>
-    <p:sldId id="259" r:id="rId5"/>
-    <p:sldId id="260" r:id="rId6"/>
-    <p:sldId id="261" r:id="rId7"/>
-    <p:sldId id="262" r:id="rId8"/>
+    <p:sldId id="263" r:id="rId4"/>
+    <p:sldId id="258" r:id="rId5"/>
+    <p:sldId id="259" r:id="rId6"/>
+    <p:sldId id="260" r:id="rId7"/>
+    <p:sldId id="261" r:id="rId8"/>
+    <p:sldId id="262" r:id="rId9"/>
   </p:sldIdLst>
   <p:sldSz cx="12192000" cy="6858000"/>
   <p:notesSz cx="6858000" cy="9144000"/>
@@ -120,6 +121,7 @@
           <p14:sldIdLst>
             <p14:sldId id="256"/>
             <p14:sldId id="257"/>
+            <p14:sldId id="263"/>
             <p14:sldId id="258"/>
             <p14:sldId id="259"/>
             <p14:sldId id="260"/>
@@ -229,7 +231,7 @@
           <a:p>
             <a:fld id="{CDEB6B38-9F37-4C6D-B680-D908BEE4561B}" type="datetimeFigureOut">
               <a:rPr lang="en-US" smtClean="0"/>
-              <a:t>4/6/2020</a:t>
+              <a:t>4/7/2020</a:t>
             </a:fld>
             <a:endParaRPr lang="en-US"/>
           </a:p>
@@ -708,7 +710,7 @@
           <a:p>
             <a:fld id="{2DF98B1B-C864-474E-9042-F4016DDDE9E1}" type="datetime1">
               <a:rPr lang="en-US" smtClean="0"/>
-              <a:t>4/6/2020</a:t>
+              <a:t>4/7/2020</a:t>
             </a:fld>
             <a:endParaRPr lang="en-US" dirty="0"/>
           </a:p>
@@ -906,7 +908,7 @@
           <a:p>
             <a:fld id="{E33518AC-1CD9-4F1E-99D4-F37A59FF64AC}" type="datetime1">
               <a:rPr lang="en-US" smtClean="0"/>
-              <a:t>4/6/2020</a:t>
+              <a:t>4/7/2020</a:t>
             </a:fld>
             <a:endParaRPr lang="en-US"/>
           </a:p>
@@ -1114,7 +1116,7 @@
           <a:p>
             <a:fld id="{5D900100-751C-434D-82E0-E10778211E6A}" type="datetime1">
               <a:rPr lang="en-US" smtClean="0"/>
-              <a:t>4/6/2020</a:t>
+              <a:t>4/7/2020</a:t>
             </a:fld>
             <a:endParaRPr lang="en-US"/>
           </a:p>
@@ -1312,7 +1314,7 @@
           <a:p>
             <a:fld id="{93B3C91B-1F81-4500-9A90-E6D50448ACBD}" type="datetime1">
               <a:rPr lang="en-US" smtClean="0"/>
-              <a:t>4/6/2020</a:t>
+              <a:t>4/7/2020</a:t>
             </a:fld>
             <a:endParaRPr lang="en-US"/>
           </a:p>
@@ -1653,7 +1655,7 @@
           <a:p>
             <a:fld id="{9BB2F436-97F6-43A8-825F-AE4CB409577D}" type="datetime1">
               <a:rPr lang="en-US" smtClean="0"/>
-              <a:t>4/6/2020</a:t>
+              <a:t>4/7/2020</a:t>
             </a:fld>
             <a:endParaRPr lang="en-US"/>
           </a:p>
@@ -1918,7 +1920,7 @@
           <a:p>
             <a:fld id="{7554E058-F659-4CEC-9A71-8F392BE21F66}" type="datetime1">
               <a:rPr lang="en-US" smtClean="0"/>
-              <a:t>4/6/2020</a:t>
+              <a:t>4/7/2020</a:t>
             </a:fld>
             <a:endParaRPr lang="en-US"/>
           </a:p>
@@ -2330,7 +2332,7 @@
           <a:p>
             <a:fld id="{BCB6EC8D-37EE-4F2A-9986-F6AF3C4F1FA6}" type="datetime1">
               <a:rPr lang="en-US" smtClean="0"/>
-              <a:t>4/6/2020</a:t>
+              <a:t>4/7/2020</a:t>
             </a:fld>
             <a:endParaRPr lang="en-US"/>
           </a:p>
@@ -2471,7 +2473,7 @@
           <a:p>
             <a:fld id="{DFB9622D-005E-4096-93C5-E37C37395A34}" type="datetime1">
               <a:rPr lang="en-US" smtClean="0"/>
-              <a:t>4/6/2020</a:t>
+              <a:t>4/7/2020</a:t>
             </a:fld>
             <a:endParaRPr lang="en-US"/>
           </a:p>
@@ -2584,7 +2586,7 @@
           <a:p>
             <a:fld id="{CCC3066D-A647-4802-8F95-9A466C868A2C}" type="datetime1">
               <a:rPr lang="en-US" smtClean="0"/>
-              <a:t>4/6/2020</a:t>
+              <a:t>4/7/2020</a:t>
             </a:fld>
             <a:endParaRPr lang="en-US"/>
           </a:p>
@@ -2895,7 +2897,7 @@
           <a:p>
             <a:fld id="{B7AC63E3-98E1-4094-8395-15839288D8D6}" type="datetime1">
               <a:rPr lang="en-US" smtClean="0"/>
-              <a:t>4/6/2020</a:t>
+              <a:t>4/7/2020</a:t>
             </a:fld>
             <a:endParaRPr lang="en-US"/>
           </a:p>
@@ -3183,7 +3185,7 @@
           <a:p>
             <a:fld id="{278EE851-FC33-49CF-8D69-14AFF5E83D53}" type="datetime1">
               <a:rPr lang="en-US" smtClean="0"/>
-              <a:t>4/6/2020</a:t>
+              <a:t>4/7/2020</a:t>
             </a:fld>
             <a:endParaRPr lang="en-US"/>
           </a:p>
@@ -3424,7 +3426,7 @@
           <a:p>
             <a:fld id="{921E40AE-8E40-418D-A718-482EDD7A085C}" type="datetime1">
               <a:rPr lang="en-US" smtClean="0"/>
-              <a:t>4/6/2020</a:t>
+              <a:t>4/7/2020</a:t>
             </a:fld>
             <a:endParaRPr lang="en-US"/>
           </a:p>
@@ -4251,6 +4253,109 @@
       </p:grpSpPr>
       <p:sp>
         <p:nvSpPr>
+          <p:cNvPr id="4" name="Slide Number Placeholder 3">
+            <a:extLst>
+              <a:ext uri="{FF2B5EF4-FFF2-40B4-BE49-F238E27FC236}">
+                <a16:creationId xmlns:a16="http://schemas.microsoft.com/office/drawing/2014/main" id="{A7522A24-3471-4FEE-8557-BC7CDA86FCA8}"/>
+              </a:ext>
+            </a:extLst>
+          </p:cNvPr>
+          <p:cNvSpPr>
+            <a:spLocks noGrp="1"/>
+          </p:cNvSpPr>
+          <p:nvPr>
+            <p:ph type="sldNum" sz="quarter" idx="12"/>
+          </p:nvPr>
+        </p:nvSpPr>
+        <p:spPr/>
+        <p:txBody>
+          <a:bodyPr/>
+          <a:lstStyle/>
+          <a:p>
+            <a:fld id="{BEE6E260-F7C6-4A1B-A19B-60668CD1E76C}" type="slidenum">
+              <a:rPr lang="en-US" smtClean="0"/>
+              <a:pPr/>
+              <a:t>3</a:t>
+            </a:fld>
+            <a:endParaRPr lang="en-US" dirty="0"/>
+          </a:p>
+        </p:txBody>
+      </p:sp>
+      <p:sp>
+        <p:nvSpPr>
+          <p:cNvPr id="3" name="TextBox 2">
+            <a:extLst>
+              <a:ext uri="{FF2B5EF4-FFF2-40B4-BE49-F238E27FC236}">
+                <a16:creationId xmlns:a16="http://schemas.microsoft.com/office/drawing/2014/main" id="{E4437BBC-750A-4E09-B943-E05C99FBE07E}"/>
+              </a:ext>
+            </a:extLst>
+          </p:cNvPr>
+          <p:cNvSpPr txBox="1"/>
+          <p:nvPr/>
+        </p:nvSpPr>
+        <p:spPr>
+          <a:xfrm>
+            <a:off x="1864311" y="2175029"/>
+            <a:ext cx="8149701" cy="2123658"/>
+          </a:xfrm>
+          <a:prstGeom prst="rect">
+            <a:avLst/>
+          </a:prstGeom>
+          <a:noFill/>
+        </p:spPr>
+        <p:txBody>
+          <a:bodyPr wrap="square" rtlCol="0">
+            <a:spAutoFit/>
+          </a:bodyPr>
+          <a:lstStyle/>
+          <a:p>
+            <a:r>
+              <a:rPr lang="en-US" sz="6600" dirty="0"/>
+              <a:t>"</a:t>
+            </a:r>
+            <a:r>
+              <a:rPr lang="en-US" sz="6600" b="1" dirty="0"/>
+              <a:t>A picture is worth a thousand words</a:t>
+            </a:r>
+            <a:r>
+              <a:rPr lang="en-US" sz="6600" dirty="0"/>
+              <a:t>"</a:t>
+            </a:r>
+          </a:p>
+        </p:txBody>
+      </p:sp>
+    </p:spTree>
+    <p:extLst>
+      <p:ext uri="{BB962C8B-B14F-4D97-AF65-F5344CB8AC3E}">
+        <p14:creationId xmlns:p14="http://schemas.microsoft.com/office/powerpoint/2010/main" val="3203625254"/>
+      </p:ext>
+    </p:extLst>
+  </p:cSld>
+  <p:clrMapOvr>
+    <a:masterClrMapping/>
+  </p:clrMapOvr>
+</p:sld>
+</file>
+
+<file path=ppt/slides/slide4.xml><?xml version="1.0" encoding="utf-8"?>
+<p:sld xmlns:a="http://schemas.openxmlformats.org/drawingml/2006/main" xmlns:r="http://schemas.openxmlformats.org/officeDocument/2006/relationships" xmlns:p="http://schemas.openxmlformats.org/presentationml/2006/main">
+  <p:cSld>
+    <p:spTree>
+      <p:nvGrpSpPr>
+        <p:cNvPr id="1" name=""/>
+        <p:cNvGrpSpPr/>
+        <p:nvPr/>
+      </p:nvGrpSpPr>
+      <p:grpSpPr>
+        <a:xfrm>
+          <a:off x="0" y="0"/>
+          <a:ext cx="0" cy="0"/>
+          <a:chOff x="0" y="0"/>
+          <a:chExt cx="0" cy="0"/>
+        </a:xfrm>
+      </p:grpSpPr>
+      <p:sp>
+        <p:nvSpPr>
           <p:cNvPr id="2" name="Title 1">
             <a:extLst>
               <a:ext uri="{FF2B5EF4-FFF2-40B4-BE49-F238E27FC236}">
@@ -4427,7 +4532,7 @@
             </a:pPr>
             <a:r>
               <a:rPr lang="en-US" dirty="0"/>
-              <a:t>More involved charting</a:t>
+              <a:t>More involved charting : fine-tuning layout and animation</a:t>
             </a:r>
           </a:p>
           <a:p>
@@ -4437,11 +4542,8 @@
             </a:pPr>
             <a:r>
               <a:rPr lang="en-US" dirty="0"/>
-              <a:t>Deploying charts (chart studio / dash)</a:t>
-            </a:r>
-          </a:p>
-          <a:p>
-            <a:endParaRPr lang="en-US" dirty="0"/>
+              <a:t>Deploying charts</a:t>
+            </a:r>
           </a:p>
         </p:txBody>
       </p:sp>
@@ -4469,7 +4571,7 @@
             <a:fld id="{BEE6E260-F7C6-4A1B-A19B-60668CD1E76C}" type="slidenum">
               <a:rPr lang="en-US" smtClean="0"/>
               <a:pPr/>
-              <a:t>3</a:t>
+              <a:t>4</a:t>
             </a:fld>
             <a:endParaRPr lang="en-US" dirty="0"/>
           </a:p>
@@ -4488,7 +4590,7 @@
 </p:sld>
 </file>
 
-<file path=ppt/slides/slide4.xml><?xml version="1.0" encoding="utf-8"?>
+<file path=ppt/slides/slide5.xml><?xml version="1.0" encoding="utf-8"?>
 <p:sld xmlns:a="http://schemas.openxmlformats.org/drawingml/2006/main" xmlns:r="http://schemas.openxmlformats.org/officeDocument/2006/relationships" xmlns:p="http://schemas.openxmlformats.org/presentationml/2006/main">
   <p:cSld>
     <p:spTree>
@@ -4637,7 +4739,7 @@
             <a:fld id="{BEE6E260-F7C6-4A1B-A19B-60668CD1E76C}" type="slidenum">
               <a:rPr lang="en-US" smtClean="0"/>
               <a:pPr/>
-              <a:t>4</a:t>
+              <a:t>5</a:t>
             </a:fld>
             <a:endParaRPr lang="en-US" dirty="0"/>
           </a:p>
@@ -4703,7 +4805,7 @@
 </p:sld>
 </file>
 
-<file path=ppt/slides/slide5.xml><?xml version="1.0" encoding="utf-8"?>
+<file path=ppt/slides/slide6.xml><?xml version="1.0" encoding="utf-8"?>
 <p:sld xmlns:a="http://schemas.openxmlformats.org/drawingml/2006/main" xmlns:r="http://schemas.openxmlformats.org/officeDocument/2006/relationships" xmlns:p="http://schemas.openxmlformats.org/presentationml/2006/main">
   <p:cSld>
     <p:spTree>
@@ -4910,7 +5012,7 @@
             <a:fld id="{BEE6E260-F7C6-4A1B-A19B-60668CD1E76C}" type="slidenum">
               <a:rPr lang="en-US" smtClean="0"/>
               <a:pPr/>
-              <a:t>5</a:t>
+              <a:t>6</a:t>
             </a:fld>
             <a:endParaRPr lang="en-US" dirty="0"/>
           </a:p>
@@ -5015,95 +5117,6 @@
 </p:sld>
 </file>
 
-<file path=ppt/slides/slide6.xml><?xml version="1.0" encoding="utf-8"?>
-<p:sld xmlns:a="http://schemas.openxmlformats.org/drawingml/2006/main" xmlns:r="http://schemas.openxmlformats.org/officeDocument/2006/relationships" xmlns:p="http://schemas.openxmlformats.org/presentationml/2006/main">
-  <p:cSld>
-    <p:spTree>
-      <p:nvGrpSpPr>
-        <p:cNvPr id="1" name=""/>
-        <p:cNvGrpSpPr/>
-        <p:nvPr/>
-      </p:nvGrpSpPr>
-      <p:grpSpPr>
-        <a:xfrm>
-          <a:off x="0" y="0"/>
-          <a:ext cx="0" cy="0"/>
-          <a:chOff x="0" y="0"/>
-          <a:chExt cx="0" cy="0"/>
-        </a:xfrm>
-      </p:grpSpPr>
-      <p:sp>
-        <p:nvSpPr>
-          <p:cNvPr id="2" name="Title 1">
-            <a:extLst>
-              <a:ext uri="{FF2B5EF4-FFF2-40B4-BE49-F238E27FC236}">
-                <a16:creationId xmlns:a16="http://schemas.microsoft.com/office/drawing/2014/main" id="{B5784B48-8379-483D-8C6B-E171029B1D7F}"/>
-              </a:ext>
-            </a:extLst>
-          </p:cNvPr>
-          <p:cNvSpPr>
-            <a:spLocks noGrp="1"/>
-          </p:cNvSpPr>
-          <p:nvPr>
-            <p:ph type="title"/>
-          </p:nvPr>
-        </p:nvSpPr>
-        <p:spPr/>
-        <p:txBody>
-          <a:bodyPr/>
-          <a:lstStyle/>
-          <a:p>
-            <a:r>
-              <a:rPr lang="en-GB" dirty="0"/>
-              <a:t>So let’s get started…</a:t>
-            </a:r>
-            <a:endParaRPr lang="en-US" dirty="0"/>
-          </a:p>
-        </p:txBody>
-      </p:sp>
-      <p:sp>
-        <p:nvSpPr>
-          <p:cNvPr id="4" name="Slide Number Placeholder 3">
-            <a:extLst>
-              <a:ext uri="{FF2B5EF4-FFF2-40B4-BE49-F238E27FC236}">
-                <a16:creationId xmlns:a16="http://schemas.microsoft.com/office/drawing/2014/main" id="{A7522A24-3471-4FEE-8557-BC7CDA86FCA8}"/>
-              </a:ext>
-            </a:extLst>
-          </p:cNvPr>
-          <p:cNvSpPr>
-            <a:spLocks noGrp="1"/>
-          </p:cNvSpPr>
-          <p:nvPr>
-            <p:ph type="sldNum" sz="quarter" idx="12"/>
-          </p:nvPr>
-        </p:nvSpPr>
-        <p:spPr/>
-        <p:txBody>
-          <a:bodyPr/>
-          <a:lstStyle/>
-          <a:p>
-            <a:fld id="{BEE6E260-F7C6-4A1B-A19B-60668CD1E76C}" type="slidenum">
-              <a:rPr lang="en-US" smtClean="0"/>
-              <a:pPr/>
-              <a:t>6</a:t>
-            </a:fld>
-            <a:endParaRPr lang="en-US" dirty="0"/>
-          </a:p>
-        </p:txBody>
-      </p:sp>
-    </p:spTree>
-    <p:extLst>
-      <p:ext uri="{BB962C8B-B14F-4D97-AF65-F5344CB8AC3E}">
-        <p14:creationId xmlns:p14="http://schemas.microsoft.com/office/powerpoint/2010/main" val="157971496"/>
-      </p:ext>
-    </p:extLst>
-  </p:cSld>
-  <p:clrMapOvr>
-    <a:masterClrMapping/>
-  </p:clrMapOvr>
-</p:sld>
-</file>
-
 <file path=ppt/slides/slide7.xml><?xml version="1.0" encoding="utf-8"?>
 <p:sld xmlns:a="http://schemas.openxmlformats.org/drawingml/2006/main" xmlns:r="http://schemas.openxmlformats.org/officeDocument/2006/relationships" xmlns:p="http://schemas.openxmlformats.org/presentationml/2006/main">
   <p:cSld>
@@ -5126,7 +5139,7 @@
           <p:cNvPr id="2" name="Title 1">
             <a:extLst>
               <a:ext uri="{FF2B5EF4-FFF2-40B4-BE49-F238E27FC236}">
-                <a16:creationId xmlns:a16="http://schemas.microsoft.com/office/drawing/2014/main" id="{0FF05A2A-2AA5-4E97-ADA3-E0E05EA8A71E}"/>
+                <a16:creationId xmlns:a16="http://schemas.microsoft.com/office/drawing/2014/main" id="{B5784B48-8379-483D-8C6B-E171029B1D7F}"/>
               </a:ext>
             </a:extLst>
           </p:cNvPr>
@@ -5144,7 +5157,7 @@
           <a:p>
             <a:r>
               <a:rPr lang="en-GB" dirty="0"/>
-              <a:t>Many thanks for listening!</a:t>
+              <a:t>So let’s get started…</a:t>
             </a:r>
             <a:endParaRPr lang="en-US" dirty="0"/>
           </a:p>
@@ -5155,7 +5168,7 @@
           <p:cNvPr id="4" name="Slide Number Placeholder 3">
             <a:extLst>
               <a:ext uri="{FF2B5EF4-FFF2-40B4-BE49-F238E27FC236}">
-                <a16:creationId xmlns:a16="http://schemas.microsoft.com/office/drawing/2014/main" id="{B894A59E-27FD-4EAE-A872-03EB31D58F17}"/>
+                <a16:creationId xmlns:a16="http://schemas.microsoft.com/office/drawing/2014/main" id="{A7522A24-3471-4FEE-8557-BC7CDA86FCA8}"/>
               </a:ext>
             </a:extLst>
           </p:cNvPr>
@@ -5175,6 +5188,100 @@
               <a:rPr lang="en-US" smtClean="0"/>
               <a:pPr/>
               <a:t>7</a:t>
+            </a:fld>
+            <a:endParaRPr lang="en-US" dirty="0"/>
+          </a:p>
+        </p:txBody>
+      </p:sp>
+    </p:spTree>
+    <p:extLst>
+      <p:ext uri="{BB962C8B-B14F-4D97-AF65-F5344CB8AC3E}">
+        <p14:creationId xmlns:p14="http://schemas.microsoft.com/office/powerpoint/2010/main" val="157971496"/>
+      </p:ext>
+    </p:extLst>
+  </p:cSld>
+  <p:clrMapOvr>
+    <a:masterClrMapping/>
+  </p:clrMapOvr>
+</p:sld>
+</file>
+
+<file path=ppt/slides/slide8.xml><?xml version="1.0" encoding="utf-8"?>
+<p:sld xmlns:a="http://schemas.openxmlformats.org/drawingml/2006/main" xmlns:r="http://schemas.openxmlformats.org/officeDocument/2006/relationships" xmlns:p="http://schemas.openxmlformats.org/presentationml/2006/main">
+  <p:cSld>
+    <p:spTree>
+      <p:nvGrpSpPr>
+        <p:cNvPr id="1" name=""/>
+        <p:cNvGrpSpPr/>
+        <p:nvPr/>
+      </p:nvGrpSpPr>
+      <p:grpSpPr>
+        <a:xfrm>
+          <a:off x="0" y="0"/>
+          <a:ext cx="0" cy="0"/>
+          <a:chOff x="0" y="0"/>
+          <a:chExt cx="0" cy="0"/>
+        </a:xfrm>
+      </p:grpSpPr>
+      <p:sp>
+        <p:nvSpPr>
+          <p:cNvPr id="2" name="Title 1">
+            <a:extLst>
+              <a:ext uri="{FF2B5EF4-FFF2-40B4-BE49-F238E27FC236}">
+                <a16:creationId xmlns:a16="http://schemas.microsoft.com/office/drawing/2014/main" id="{0FF05A2A-2AA5-4E97-ADA3-E0E05EA8A71E}"/>
+              </a:ext>
+            </a:extLst>
+          </p:cNvPr>
+          <p:cNvSpPr>
+            <a:spLocks noGrp="1"/>
+          </p:cNvSpPr>
+          <p:nvPr>
+            <p:ph type="title"/>
+          </p:nvPr>
+        </p:nvSpPr>
+        <p:spPr>
+          <a:xfrm>
+            <a:off x="3093129" y="2513522"/>
+            <a:ext cx="10515600" cy="1325563"/>
+          </a:xfrm>
+        </p:spPr>
+        <p:txBody>
+          <a:bodyPr/>
+          <a:lstStyle/>
+          <a:p>
+            <a:r>
+              <a:rPr lang="en-GB" dirty="0"/>
+              <a:t>Many thanks for listening!</a:t>
+            </a:r>
+            <a:endParaRPr lang="en-US" dirty="0"/>
+          </a:p>
+        </p:txBody>
+      </p:sp>
+      <p:sp>
+        <p:nvSpPr>
+          <p:cNvPr id="4" name="Slide Number Placeholder 3">
+            <a:extLst>
+              <a:ext uri="{FF2B5EF4-FFF2-40B4-BE49-F238E27FC236}">
+                <a16:creationId xmlns:a16="http://schemas.microsoft.com/office/drawing/2014/main" id="{B894A59E-27FD-4EAE-A872-03EB31D58F17}"/>
+              </a:ext>
+            </a:extLst>
+          </p:cNvPr>
+          <p:cNvSpPr>
+            <a:spLocks noGrp="1"/>
+          </p:cNvSpPr>
+          <p:nvPr>
+            <p:ph type="sldNum" sz="quarter" idx="12"/>
+          </p:nvPr>
+        </p:nvSpPr>
+        <p:spPr/>
+        <p:txBody>
+          <a:bodyPr/>
+          <a:lstStyle/>
+          <a:p>
+            <a:fld id="{BEE6E260-F7C6-4A1B-A19B-60668CD1E76C}" type="slidenum">
+              <a:rPr lang="en-US" smtClean="0"/>
+              <a:pPr/>
+              <a:t>8</a:t>
             </a:fld>
             <a:endParaRPr lang="en-US" dirty="0"/>
           </a:p>

</xml_diff>